<commit_message>
Se agregan cosas a la presentación
</commit_message>
<xml_diff>
--- a/Mnewplan/Presentacion.pptx
+++ b/Mnewplan/Presentacion.pptx
@@ -9,8 +9,11 @@
     <p:sldId id="262" r:id="rId3"/>
     <p:sldId id="263" r:id="rId4"/>
     <p:sldId id="264" r:id="rId5"/>
-    <p:sldId id="265" r:id="rId6"/>
-    <p:sldId id="266" r:id="rId7"/>
+    <p:sldId id="267" r:id="rId6"/>
+    <p:sldId id="268" r:id="rId7"/>
+    <p:sldId id="265" r:id="rId8"/>
+    <p:sldId id="266" r:id="rId9"/>
+    <p:sldId id="269" r:id="rId10"/>
   </p:sldIdLst>
   <p:sldSz cx="9144000" cy="6858000" type="screen4x3"/>
   <p:notesSz cx="6858000" cy="9144000"/>
@@ -2577,15 +2580,7 @@
           <a:bodyPr/>
           <a:lstStyle/>
           <a:p>
-            <a:r>
-              <a:rPr lang="es-ES_tradnl" dirty="0" smtClean="0"/>
-              <a:t>Gr</a:t>
-            </a:r>
-            <a:r>
-              <a:rPr lang="es-ES" dirty="0" err="1" smtClean="0"/>
-              <a:t>áficamente</a:t>
-            </a:r>
-            <a:endParaRPr lang="es-ES_tradnl" dirty="0"/>
+            <a:endParaRPr lang="es-ES_tradnl"/>
           </a:p>
         </p:txBody>
       </p:sp>
@@ -2607,20 +2602,49 @@
               </a:ext>
             </a:extLst>
           </a:blip>
-          <a:srcRect l="3539" t="37307" r="27279" b="19158"/>
+          <a:srcRect l="5859" t="31570" r="28545" b="46494"/>
           <a:stretch/>
         </p:blipFill>
         <p:spPr>
           <a:xfrm>
-            <a:off x="1622790" y="2600325"/>
-            <a:ext cx="6720667" cy="2643188"/>
-          </a:xfrm>
+            <a:off x="2628900" y="1928812"/>
+            <a:ext cx="4443412" cy="928688"/>
+          </a:xfrm>
+        </p:spPr>
+      </p:pic>
+      <p:pic>
+        <p:nvPicPr>
+          <p:cNvPr id="5" name="Imagen 4"/>
+          <p:cNvPicPr>
+            <a:picLocks noChangeAspect="1"/>
+          </p:cNvPicPr>
+          <p:nvPr/>
+        </p:nvPicPr>
+        <p:blipFill rotWithShape="1">
+          <a:blip r:embed="rId3">
+            <a:extLst>
+              <a:ext uri="{28A0092B-C50C-407E-A947-70E740481C1C}">
+                <a14:useLocalDpi xmlns:a14="http://schemas.microsoft.com/office/drawing/2010/main" val="0"/>
+              </a:ext>
+            </a:extLst>
+          </a:blip>
+          <a:srcRect l="2031" t="36500" r="26562" b="37250"/>
+          <a:stretch/>
+        </p:blipFill>
+        <p:spPr>
+          <a:xfrm>
+            <a:off x="2628900" y="3261067"/>
+            <a:ext cx="4443412" cy="1110910"/>
+          </a:xfrm>
+          <a:prstGeom prst="rect">
+            <a:avLst/>
+          </a:prstGeom>
         </p:spPr>
       </p:pic>
     </p:spTree>
     <p:extLst>
       <p:ext uri="{BB962C8B-B14F-4D97-AF65-F5344CB8AC3E}">
-        <p14:creationId xmlns:p14="http://schemas.microsoft.com/office/powerpoint/2010/main" val="33021814"/>
+        <p14:creationId xmlns:p14="http://schemas.microsoft.com/office/powerpoint/2010/main" val="747389749"/>
       </p:ext>
     </p:extLst>
   </p:cSld>
@@ -2666,6 +2690,168 @@
           </a:p>
         </p:txBody>
       </p:sp>
+      <p:pic>
+        <p:nvPicPr>
+          <p:cNvPr id="4" name="Marcador de contenido 3"/>
+          <p:cNvPicPr>
+            <a:picLocks noGrp="1" noChangeAspect="1"/>
+          </p:cNvPicPr>
+          <p:nvPr>
+            <p:ph idx="1"/>
+          </p:nvPr>
+        </p:nvPicPr>
+        <p:blipFill rotWithShape="1">
+          <a:blip r:embed="rId2">
+            <a:extLst>
+              <a:ext uri="{28A0092B-C50C-407E-A947-70E740481C1C}">
+                <a14:useLocalDpi xmlns:a14="http://schemas.microsoft.com/office/drawing/2010/main" val="0"/>
+              </a:ext>
+            </a:extLst>
+          </a:blip>
+          <a:srcRect l="4383" t="36970" r="32552" b="39070"/>
+          <a:stretch/>
+        </p:blipFill>
+        <p:spPr>
+          <a:xfrm>
+            <a:off x="1643063" y="2643188"/>
+            <a:ext cx="6618529" cy="1571626"/>
+          </a:xfrm>
+        </p:spPr>
+      </p:pic>
+    </p:spTree>
+    <p:extLst>
+      <p:ext uri="{BB962C8B-B14F-4D97-AF65-F5344CB8AC3E}">
+        <p14:creationId xmlns:p14="http://schemas.microsoft.com/office/powerpoint/2010/main" val="1952734467"/>
+      </p:ext>
+    </p:extLst>
+  </p:cSld>
+  <p:clrMapOvr>
+    <a:masterClrMapping/>
+  </p:clrMapOvr>
+</p:sld>
+</file>
+
+<file path=ppt/slides/slide7.xml><?xml version="1.0" encoding="utf-8"?>
+<p:sld xmlns:a="http://schemas.openxmlformats.org/drawingml/2006/main" xmlns:r="http://schemas.openxmlformats.org/officeDocument/2006/relationships" xmlns:p="http://schemas.openxmlformats.org/presentationml/2006/main">
+  <p:cSld>
+    <p:spTree>
+      <p:nvGrpSpPr>
+        <p:cNvPr id="1" name=""/>
+        <p:cNvGrpSpPr/>
+        <p:nvPr/>
+      </p:nvGrpSpPr>
+      <p:grpSpPr>
+        <a:xfrm>
+          <a:off x="0" y="0"/>
+          <a:ext cx="0" cy="0"/>
+          <a:chOff x="0" y="0"/>
+          <a:chExt cx="0" cy="0"/>
+        </a:xfrm>
+      </p:grpSpPr>
+      <p:sp>
+        <p:nvSpPr>
+          <p:cNvPr id="2" name="Título 1"/>
+          <p:cNvSpPr>
+            <a:spLocks noGrp="1"/>
+          </p:cNvSpPr>
+          <p:nvPr>
+            <p:ph type="title"/>
+          </p:nvPr>
+        </p:nvSpPr>
+        <p:spPr/>
+        <p:txBody>
+          <a:bodyPr/>
+          <a:lstStyle/>
+          <a:p>
+            <a:r>
+              <a:rPr lang="es-ES_tradnl" dirty="0" smtClean="0"/>
+              <a:t>Gr</a:t>
+            </a:r>
+            <a:r>
+              <a:rPr lang="es-ES" dirty="0" err="1" smtClean="0"/>
+              <a:t>áficamente</a:t>
+            </a:r>
+            <a:endParaRPr lang="es-ES_tradnl" dirty="0"/>
+          </a:p>
+        </p:txBody>
+      </p:sp>
+      <p:pic>
+        <p:nvPicPr>
+          <p:cNvPr id="4" name="Marcador de contenido 3"/>
+          <p:cNvPicPr>
+            <a:picLocks noGrp="1" noChangeAspect="1"/>
+          </p:cNvPicPr>
+          <p:nvPr>
+            <p:ph idx="1"/>
+          </p:nvPr>
+        </p:nvPicPr>
+        <p:blipFill rotWithShape="1">
+          <a:blip r:embed="rId2">
+            <a:extLst>
+              <a:ext uri="{28A0092B-C50C-407E-A947-70E740481C1C}">
+                <a14:useLocalDpi xmlns:a14="http://schemas.microsoft.com/office/drawing/2010/main" val="0"/>
+              </a:ext>
+            </a:extLst>
+          </a:blip>
+          <a:srcRect l="3539" t="37307" r="27279" b="19158"/>
+          <a:stretch/>
+        </p:blipFill>
+        <p:spPr>
+          <a:xfrm>
+            <a:off x="1622790" y="2600325"/>
+            <a:ext cx="6720667" cy="2643188"/>
+          </a:xfrm>
+        </p:spPr>
+      </p:pic>
+    </p:spTree>
+    <p:extLst>
+      <p:ext uri="{BB962C8B-B14F-4D97-AF65-F5344CB8AC3E}">
+        <p14:creationId xmlns:p14="http://schemas.microsoft.com/office/powerpoint/2010/main" val="33021814"/>
+      </p:ext>
+    </p:extLst>
+  </p:cSld>
+  <p:clrMapOvr>
+    <a:masterClrMapping/>
+  </p:clrMapOvr>
+</p:sld>
+</file>
+
+<file path=ppt/slides/slide8.xml><?xml version="1.0" encoding="utf-8"?>
+<p:sld xmlns:a="http://schemas.openxmlformats.org/drawingml/2006/main" xmlns:r="http://schemas.openxmlformats.org/officeDocument/2006/relationships" xmlns:p="http://schemas.openxmlformats.org/presentationml/2006/main">
+  <p:cSld>
+    <p:spTree>
+      <p:nvGrpSpPr>
+        <p:cNvPr id="1" name=""/>
+        <p:cNvGrpSpPr/>
+        <p:nvPr/>
+      </p:nvGrpSpPr>
+      <p:grpSpPr>
+        <a:xfrm>
+          <a:off x="0" y="0"/>
+          <a:ext cx="0" cy="0"/>
+          <a:chOff x="0" y="0"/>
+          <a:chExt cx="0" cy="0"/>
+        </a:xfrm>
+      </p:grpSpPr>
+      <p:sp>
+        <p:nvSpPr>
+          <p:cNvPr id="2" name="Título 1"/>
+          <p:cNvSpPr>
+            <a:spLocks noGrp="1"/>
+          </p:cNvSpPr>
+          <p:nvPr>
+            <p:ph type="title"/>
+          </p:nvPr>
+        </p:nvSpPr>
+        <p:spPr/>
+        <p:txBody>
+          <a:bodyPr/>
+          <a:lstStyle/>
+          <a:p>
+            <a:endParaRPr lang="es-ES_tradnl"/>
+          </a:p>
+        </p:txBody>
+      </p:sp>
       <p:sp>
         <p:nvSpPr>
           <p:cNvPr id="3" name="Marcador de contenido 2"/>
@@ -2725,6 +2911,83 @@
     <p:extLst>
       <p:ext uri="{BB962C8B-B14F-4D97-AF65-F5344CB8AC3E}">
         <p14:creationId xmlns:p14="http://schemas.microsoft.com/office/powerpoint/2010/main" val="1126392845"/>
+      </p:ext>
+    </p:extLst>
+  </p:cSld>
+  <p:clrMapOvr>
+    <a:masterClrMapping/>
+  </p:clrMapOvr>
+</p:sld>
+</file>
+
+<file path=ppt/slides/slide9.xml><?xml version="1.0" encoding="utf-8"?>
+<p:sld xmlns:a="http://schemas.openxmlformats.org/drawingml/2006/main" xmlns:r="http://schemas.openxmlformats.org/officeDocument/2006/relationships" xmlns:p="http://schemas.openxmlformats.org/presentationml/2006/main">
+  <p:cSld>
+    <p:spTree>
+      <p:nvGrpSpPr>
+        <p:cNvPr id="1" name=""/>
+        <p:cNvGrpSpPr/>
+        <p:nvPr/>
+      </p:nvGrpSpPr>
+      <p:grpSpPr>
+        <a:xfrm>
+          <a:off x="0" y="0"/>
+          <a:ext cx="0" cy="0"/>
+          <a:chOff x="0" y="0"/>
+          <a:chExt cx="0" cy="0"/>
+        </a:xfrm>
+      </p:grpSpPr>
+      <p:sp>
+        <p:nvSpPr>
+          <p:cNvPr id="2" name="Título 1"/>
+          <p:cNvSpPr>
+            <a:spLocks noGrp="1"/>
+          </p:cNvSpPr>
+          <p:nvPr>
+            <p:ph type="title"/>
+          </p:nvPr>
+        </p:nvSpPr>
+        <p:spPr/>
+        <p:txBody>
+          <a:bodyPr/>
+          <a:lstStyle/>
+          <a:p>
+            <a:endParaRPr lang="es-ES_tradnl"/>
+          </a:p>
+        </p:txBody>
+      </p:sp>
+      <p:pic>
+        <p:nvPicPr>
+          <p:cNvPr id="4" name="Marcador de contenido 3"/>
+          <p:cNvPicPr>
+            <a:picLocks noGrp="1" noChangeAspect="1"/>
+          </p:cNvPicPr>
+          <p:nvPr>
+            <p:ph idx="1"/>
+          </p:nvPr>
+        </p:nvPicPr>
+        <p:blipFill rotWithShape="1">
+          <a:blip r:embed="rId2">
+            <a:extLst>
+              <a:ext uri="{28A0092B-C50C-407E-A947-70E740481C1C}">
+                <a14:useLocalDpi xmlns:a14="http://schemas.microsoft.com/office/drawing/2010/main" val="0"/>
+              </a:ext>
+            </a:extLst>
+          </a:blip>
+          <a:srcRect l="9656" t="16384" r="39934" b="14772"/>
+          <a:stretch/>
+        </p:blipFill>
+        <p:spPr>
+          <a:xfrm>
+            <a:off x="2458329" y="2044282"/>
+            <a:ext cx="4099633" cy="3499270"/>
+          </a:xfrm>
+        </p:spPr>
+      </p:pic>
+    </p:spTree>
+    <p:extLst>
+      <p:ext uri="{BB962C8B-B14F-4D97-AF65-F5344CB8AC3E}">
+        <p14:creationId xmlns:p14="http://schemas.microsoft.com/office/powerpoint/2010/main" val="1309282755"/>
       </p:ext>
     </p:extLst>
   </p:cSld>

</xml_diff>